<commit_message>
Main page design added; Tobacco page design edited
</commit_message>
<xml_diff>
--- a/design/ppt/design_tobacco_page.pptx
+++ b/design/ppt/design_tobacco_page.pptx
@@ -104,6 +104,11 @@
       </a:defRPr>
     </a:lvl9pPr>
   </p:defaultTextStyle>
+  <p:extLst>
+    <p:ext uri="{EFAFB233-063F-42B5-8137-9DF3F51BA10A}">
+      <p15:sldGuideLst xmlns:p15="http://schemas.microsoft.com/office/powerpoint/2012/main"/>
+    </p:ext>
+  </p:extLst>
 </p:presentation>
 </file>
 
@@ -3462,7 +3467,7 @@
                   </a:schemeClr>
                 </a:solidFill>
               </a:rPr>
-              <a:t>ТобакоПоиск</a:t>
+              <a:t>ТабакоПоиск</a:t>
             </a:r>
           </a:p>
         </p:txBody>
@@ -3680,7 +3685,7 @@
         </p:nvSpPr>
         <p:spPr>
           <a:xfrm>
-            <a:off x="6451183" y="763546"/>
+            <a:off x="6451183" y="821575"/>
             <a:ext cx="1001948" cy="369332"/>
           </a:xfrm>
           <a:prstGeom prst="rect">
@@ -3727,7 +3732,7 @@
         </p:nvSpPr>
         <p:spPr>
           <a:xfrm>
-            <a:off x="7315525" y="680528"/>
+            <a:off x="7315525" y="738557"/>
             <a:ext cx="1796344" cy="523220"/>
           </a:xfrm>
           <a:prstGeom prst="rect">
@@ -6301,7 +6306,7 @@
         </p:blipFill>
         <p:spPr>
           <a:xfrm>
-            <a:off x="4684292" y="3850570"/>
+            <a:off x="4491053" y="3767820"/>
             <a:ext cx="196360" cy="196360"/>
           </a:xfrm>
           <a:prstGeom prst="rect">
@@ -6324,7 +6329,7 @@
         </p:nvSpPr>
         <p:spPr>
           <a:xfrm>
-            <a:off x="4848452" y="3804156"/>
+            <a:off x="4655213" y="3721406"/>
             <a:ext cx="554753" cy="307777"/>
           </a:xfrm>
           <a:prstGeom prst="rect">
@@ -6372,7 +6377,7 @@
         </p:nvSpPr>
         <p:spPr>
           <a:xfrm>
-            <a:off x="4339425" y="3543588"/>
+            <a:off x="3424856" y="3721406"/>
             <a:ext cx="886093" cy="307777"/>
           </a:xfrm>
           <a:prstGeom prst="rect">
@@ -6453,7 +6458,7 @@
         </p:blipFill>
         <p:spPr>
           <a:xfrm>
-            <a:off x="4178518" y="3597611"/>
+            <a:off x="3263949" y="3775429"/>
             <a:ext cx="185409" cy="185409"/>
           </a:xfrm>
           <a:prstGeom prst="rect">
@@ -7168,7 +7173,7 @@
                   </a:schemeClr>
                 </a:solidFill>
               </a:rPr>
-              <a:t>ТобакоПоиск</a:t>
+              <a:t>ТабакоПоиск</a:t>
             </a:r>
           </a:p>
           <a:p>
@@ -7211,9 +7216,9 @@
             <a:r>
               <a:rPr lang="ru-RU" sz="1100" i="1" dirty="0">
                 <a:solidFill>
-                  <a:schemeClr val="accent5">
-                    <a:lumMod val="40000"/>
-                    <a:lumOff val="60000"/>
+                  <a:schemeClr val="accent2">
+                    <a:lumMod val="20000"/>
+                    <a:lumOff val="80000"/>
                   </a:schemeClr>
                 </a:solidFill>
                 <a:latin typeface="Book Antiqua" panose="02040602050305030304" pitchFamily="18" charset="0"/>
@@ -7249,9 +7254,9 @@
             <a:r>
               <a:rPr lang="ru-RU" sz="1100" i="1" dirty="0">
                 <a:solidFill>
-                  <a:schemeClr val="accent5">
-                    <a:lumMod val="40000"/>
-                    <a:lumOff val="60000"/>
+                  <a:schemeClr val="accent2">
+                    <a:lumMod val="20000"/>
+                    <a:lumOff val="80000"/>
                   </a:schemeClr>
                 </a:solidFill>
                 <a:latin typeface="Book Antiqua" panose="02040602050305030304" pitchFamily="18" charset="0"/>
@@ -7394,6 +7399,52 @@
           </a:p>
         </p:txBody>
       </p:sp>
+      <p:cxnSp>
+        <p:nvCxnSpPr>
+          <p:cNvPr id="3" name="Прямая соединительная линия 2"/>
+          <p:cNvCxnSpPr>
+            <a:cxnSpLocks/>
+          </p:cNvCxnSpPr>
+          <p:nvPr/>
+        </p:nvCxnSpPr>
+        <p:spPr>
+          <a:xfrm>
+            <a:off x="3100606" y="665122"/>
+            <a:ext cx="5988505" cy="0"/>
+          </a:xfrm>
+          <a:prstGeom prst="line">
+            <a:avLst/>
+          </a:prstGeom>
+          <a:ln w="12700">
+            <a:solidFill>
+              <a:schemeClr val="bg1">
+                <a:lumMod val="50000"/>
+              </a:schemeClr>
+            </a:solidFill>
+          </a:ln>
+          <a:effectLst>
+            <a:outerShdw blurRad="50800" dist="38100" dir="2700000" algn="tl" rotWithShape="0">
+              <a:prstClr val="black">
+                <a:alpha val="40000"/>
+              </a:prstClr>
+            </a:outerShdw>
+          </a:effectLst>
+        </p:spPr>
+        <p:style>
+          <a:lnRef idx="1">
+            <a:schemeClr val="dk1"/>
+          </a:lnRef>
+          <a:fillRef idx="0">
+            <a:schemeClr val="dk1"/>
+          </a:fillRef>
+          <a:effectRef idx="0">
+            <a:schemeClr val="dk1"/>
+          </a:effectRef>
+          <a:fontRef idx="minor">
+            <a:schemeClr val="tx1"/>
+          </a:fontRef>
+        </p:style>
+      </p:cxnSp>
     </p:spTree>
     <p:extLst>
       <p:ext uri="{BB962C8B-B14F-4D97-AF65-F5344CB8AC3E}">

</xml_diff>